<commit_message>
added financial parameters and started to set up model
</commit_message>
<xml_diff>
--- a/results/results.pptx
+++ b/results/results.pptx
@@ -14,8 +14,10 @@
     <p:sldId id="262" r:id="rId8"/>
     <p:sldId id="261" r:id="rId9"/>
     <p:sldId id="264" r:id="rId10"/>
-    <p:sldId id="265" r:id="rId11"/>
-    <p:sldId id="266" r:id="rId12"/>
+    <p:sldId id="267" r:id="rId11"/>
+    <p:sldId id="265" r:id="rId12"/>
+    <p:sldId id="266" r:id="rId13"/>
+    <p:sldId id="268" r:id="rId14"/>
   </p:sldIdLst>
   <p:sldSz cx="12192000" cy="6858000"/>
   <p:notesSz cx="6858000" cy="9144000"/>
@@ -671,6 +673,7 @@
             <c:showLeaderLines val="0"/>
             <c:extLst>
               <c:ext xmlns:c15="http://schemas.microsoft.com/office/drawing/2012/chart" uri="{CE6537A1-D6FC-4f65-9D91-7224C49458BB}">
+                <c15:layout/>
                 <c15:showLeaderLines val="1"/>
                 <c15:leaderLines>
                   <c:spPr>
@@ -1776,6 +1779,7 @@
             <c:showLeaderLines val="0"/>
             <c:extLst>
               <c:ext xmlns:c15="http://schemas.microsoft.com/office/drawing/2012/chart" uri="{CE6537A1-D6FC-4f65-9D91-7224C49458BB}">
+                <c15:layout/>
                 <c15:showLeaderLines val="1"/>
                 <c15:leaderLines>
                   <c:spPr>
@@ -2125,6 +2129,7 @@
             <c:showLeaderLines val="0"/>
             <c:extLst>
               <c:ext xmlns:c15="http://schemas.microsoft.com/office/drawing/2012/chart" uri="{CE6537A1-D6FC-4f65-9D91-7224C49458BB}">
+                <c15:layout/>
                 <c15:showLeaderLines val="1"/>
                 <c15:leaderLines>
                   <c:spPr>
@@ -3112,6 +3117,7 @@
             <c:showLeaderLines val="0"/>
             <c:extLst>
               <c:ext xmlns:c15="http://schemas.microsoft.com/office/drawing/2012/chart" uri="{CE6537A1-D6FC-4f65-9D91-7224C49458BB}">
+                <c15:layout/>
                 <c15:showLeaderLines val="1"/>
                 <c15:leaderLines>
                   <c:spPr>
@@ -3397,6 +3403,7 @@
           </a:p>
         </c:rich>
       </c:tx>
+      <c:layout/>
       <c:overlay val="0"/>
       <c:spPr>
         <a:noFill/>
@@ -4166,6 +4173,7 @@
               </a:p>
             </c:rich>
           </c:tx>
+          <c:layout/>
           <c:overlay val="0"/>
           <c:spPr>
             <a:noFill/>
@@ -4356,6 +4364,7 @@
             <c:showLeaderLines val="0"/>
             <c:extLst>
               <c:ext xmlns:c15="http://schemas.microsoft.com/office/drawing/2012/chart" uri="{CE6537A1-D6FC-4f65-9D91-7224C49458BB}">
+                <c15:layout/>
                 <c15:showLeaderLines val="1"/>
                 <c15:leaderLines>
                   <c:spPr>
@@ -5343,6 +5352,7 @@
             <c:showLeaderLines val="0"/>
             <c:extLst>
               <c:ext xmlns:c15="http://schemas.microsoft.com/office/drawing/2012/chart" uri="{CE6537A1-D6FC-4f65-9D91-7224C49458BB}">
+                <c15:layout/>
                 <c15:showLeaderLines val="1"/>
                 <c15:leaderLines>
                   <c:spPr>
@@ -5632,6 +5642,7 @@
           </a:p>
         </c:rich>
       </c:tx>
+      <c:layout/>
       <c:overlay val="0"/>
       <c:spPr>
         <a:noFill/>
@@ -6408,6 +6419,7 @@
               </a:p>
             </c:rich>
           </c:tx>
+          <c:layout/>
           <c:overlay val="0"/>
           <c:spPr>
             <a:noFill/>
@@ -6552,6 +6564,7 @@
           </a:p>
         </c:rich>
       </c:tx>
+      <c:layout/>
       <c:overlay val="0"/>
       <c:spPr>
         <a:noFill/>
@@ -7328,6 +7341,7 @@
               </a:p>
             </c:rich>
           </c:tx>
+          <c:layout/>
           <c:overlay val="0"/>
           <c:spPr>
             <a:noFill/>
@@ -18518,7 +18532,7 @@
           <a:p>
             <a:fld id="{9E5279F9-023E-49B1-9FC4-A08662BF525B}" type="datetimeFigureOut">
               <a:rPr lang="en-US" smtClean="0"/>
-              <a:t>4/19/2019</a:t>
+              <a:t>4/30/2019</a:t>
             </a:fld>
             <a:endParaRPr lang="en-US"/>
           </a:p>
@@ -18688,7 +18702,7 @@
           <a:p>
             <a:fld id="{9E5279F9-023E-49B1-9FC4-A08662BF525B}" type="datetimeFigureOut">
               <a:rPr lang="en-US" smtClean="0"/>
-              <a:t>4/19/2019</a:t>
+              <a:t>4/30/2019</a:t>
             </a:fld>
             <a:endParaRPr lang="en-US"/>
           </a:p>
@@ -18868,7 +18882,7 @@
           <a:p>
             <a:fld id="{9E5279F9-023E-49B1-9FC4-A08662BF525B}" type="datetimeFigureOut">
               <a:rPr lang="en-US" smtClean="0"/>
-              <a:t>4/19/2019</a:t>
+              <a:t>4/30/2019</a:t>
             </a:fld>
             <a:endParaRPr lang="en-US"/>
           </a:p>
@@ -19038,7 +19052,7 @@
           <a:p>
             <a:fld id="{9E5279F9-023E-49B1-9FC4-A08662BF525B}" type="datetimeFigureOut">
               <a:rPr lang="en-US" smtClean="0"/>
-              <a:t>4/19/2019</a:t>
+              <a:t>4/30/2019</a:t>
             </a:fld>
             <a:endParaRPr lang="en-US"/>
           </a:p>
@@ -19284,7 +19298,7 @@
           <a:p>
             <a:fld id="{9E5279F9-023E-49B1-9FC4-A08662BF525B}" type="datetimeFigureOut">
               <a:rPr lang="en-US" smtClean="0"/>
-              <a:t>4/19/2019</a:t>
+              <a:t>4/30/2019</a:t>
             </a:fld>
             <a:endParaRPr lang="en-US"/>
           </a:p>
@@ -19516,7 +19530,7 @@
           <a:p>
             <a:fld id="{9E5279F9-023E-49B1-9FC4-A08662BF525B}" type="datetimeFigureOut">
               <a:rPr lang="en-US" smtClean="0"/>
-              <a:t>4/19/2019</a:t>
+              <a:t>4/30/2019</a:t>
             </a:fld>
             <a:endParaRPr lang="en-US"/>
           </a:p>
@@ -19883,7 +19897,7 @@
           <a:p>
             <a:fld id="{9E5279F9-023E-49B1-9FC4-A08662BF525B}" type="datetimeFigureOut">
               <a:rPr lang="en-US" smtClean="0"/>
-              <a:t>4/19/2019</a:t>
+              <a:t>4/30/2019</a:t>
             </a:fld>
             <a:endParaRPr lang="en-US"/>
           </a:p>
@@ -20001,7 +20015,7 @@
           <a:p>
             <a:fld id="{9E5279F9-023E-49B1-9FC4-A08662BF525B}" type="datetimeFigureOut">
               <a:rPr lang="en-US" smtClean="0"/>
-              <a:t>4/19/2019</a:t>
+              <a:t>4/30/2019</a:t>
             </a:fld>
             <a:endParaRPr lang="en-US"/>
           </a:p>
@@ -20096,7 +20110,7 @@
           <a:p>
             <a:fld id="{9E5279F9-023E-49B1-9FC4-A08662BF525B}" type="datetimeFigureOut">
               <a:rPr lang="en-US" smtClean="0"/>
-              <a:t>4/19/2019</a:t>
+              <a:t>4/30/2019</a:t>
             </a:fld>
             <a:endParaRPr lang="en-US"/>
           </a:p>
@@ -20373,7 +20387,7 @@
           <a:p>
             <a:fld id="{9E5279F9-023E-49B1-9FC4-A08662BF525B}" type="datetimeFigureOut">
               <a:rPr lang="en-US" smtClean="0"/>
-              <a:t>4/19/2019</a:t>
+              <a:t>4/30/2019</a:t>
             </a:fld>
             <a:endParaRPr lang="en-US"/>
           </a:p>
@@ -20626,7 +20640,7 @@
           <a:p>
             <a:fld id="{9E5279F9-023E-49B1-9FC4-A08662BF525B}" type="datetimeFigureOut">
               <a:rPr lang="en-US" smtClean="0"/>
-              <a:t>4/19/2019</a:t>
+              <a:t>4/30/2019</a:t>
             </a:fld>
             <a:endParaRPr lang="en-US"/>
           </a:p>
@@ -20839,7 +20853,7 @@
           <a:p>
             <a:fld id="{9E5279F9-023E-49B1-9FC4-A08662BF525B}" type="datetimeFigureOut">
               <a:rPr lang="en-US" smtClean="0"/>
-              <a:t>4/19/2019</a:t>
+              <a:t>4/30/2019</a:t>
             </a:fld>
             <a:endParaRPr lang="en-US"/>
           </a:p>
@@ -21305,10 +21319,150 @@
   <p:clrMapOvr>
     <a:masterClrMapping/>
   </p:clrMapOvr>
+  <p:timing>
+    <p:tnLst>
+      <p:par>
+        <p:cTn id="1" dur="indefinite" restart="never" nodeType="tmRoot"/>
+      </p:par>
+    </p:tnLst>
+  </p:timing>
 </p:sld>
 </file>
 
 <file path=ppt/slides/slide10.xml><?xml version="1.0" encoding="utf-8"?>
+<p:sld xmlns:a="http://schemas.openxmlformats.org/drawingml/2006/main" xmlns:r="http://schemas.openxmlformats.org/officeDocument/2006/relationships" xmlns:p="http://schemas.openxmlformats.org/presentationml/2006/main">
+  <p:cSld>
+    <p:spTree>
+      <p:nvGrpSpPr>
+        <p:cNvPr id="1" name=""/>
+        <p:cNvGrpSpPr/>
+        <p:nvPr/>
+      </p:nvGrpSpPr>
+      <p:grpSpPr>
+        <a:xfrm>
+          <a:off x="0" y="0"/>
+          <a:ext cx="0" cy="0"/>
+          <a:chOff x="0" y="0"/>
+          <a:chExt cx="0" cy="0"/>
+        </a:xfrm>
+      </p:grpSpPr>
+      <p:pic>
+        <p:nvPicPr>
+          <p:cNvPr id="4" name="Picture 3"/>
+          <p:cNvPicPr>
+            <a:picLocks noChangeAspect="1"/>
+          </p:cNvPicPr>
+          <p:nvPr/>
+        </p:nvPicPr>
+        <p:blipFill>
+          <a:blip r:embed="rId2"/>
+          <a:stretch>
+            <a:fillRect/>
+          </a:stretch>
+        </p:blipFill>
+        <p:spPr>
+          <a:xfrm>
+            <a:off x="0" y="3259459"/>
+            <a:ext cx="4780085" cy="3598541"/>
+          </a:xfrm>
+          <a:prstGeom prst="rect">
+            <a:avLst/>
+          </a:prstGeom>
+        </p:spPr>
+      </p:pic>
+      <p:pic>
+        <p:nvPicPr>
+          <p:cNvPr id="5" name="Picture 4"/>
+          <p:cNvPicPr>
+            <a:picLocks noChangeAspect="1"/>
+          </p:cNvPicPr>
+          <p:nvPr/>
+        </p:nvPicPr>
+        <p:blipFill>
+          <a:blip r:embed="rId3"/>
+          <a:stretch>
+            <a:fillRect/>
+          </a:stretch>
+        </p:blipFill>
+        <p:spPr>
+          <a:xfrm>
+            <a:off x="6734908" y="3259459"/>
+            <a:ext cx="4282586" cy="3446212"/>
+          </a:xfrm>
+          <a:prstGeom prst="rect">
+            <a:avLst/>
+          </a:prstGeom>
+        </p:spPr>
+      </p:pic>
+      <p:pic>
+        <p:nvPicPr>
+          <p:cNvPr id="6" name="Picture 5"/>
+          <p:cNvPicPr>
+            <a:picLocks noChangeAspect="1"/>
+          </p:cNvPicPr>
+          <p:nvPr/>
+        </p:nvPicPr>
+        <p:blipFill>
+          <a:blip r:embed="rId4"/>
+          <a:stretch>
+            <a:fillRect/>
+          </a:stretch>
+        </p:blipFill>
+        <p:spPr>
+          <a:xfrm>
+            <a:off x="342899" y="0"/>
+            <a:ext cx="4357072" cy="3438142"/>
+          </a:xfrm>
+          <a:prstGeom prst="rect">
+            <a:avLst/>
+          </a:prstGeom>
+        </p:spPr>
+      </p:pic>
+      <p:pic>
+        <p:nvPicPr>
+          <p:cNvPr id="7" name="Picture 6"/>
+          <p:cNvPicPr>
+            <a:picLocks noChangeAspect="1"/>
+          </p:cNvPicPr>
+          <p:nvPr/>
+        </p:nvPicPr>
+        <p:blipFill>
+          <a:blip r:embed="rId5"/>
+          <a:stretch>
+            <a:fillRect/>
+          </a:stretch>
+        </p:blipFill>
+        <p:spPr>
+          <a:xfrm>
+            <a:off x="6957100" y="0"/>
+            <a:ext cx="4060394" cy="3458235"/>
+          </a:xfrm>
+          <a:prstGeom prst="rect">
+            <a:avLst/>
+          </a:prstGeom>
+        </p:spPr>
+      </p:pic>
+    </p:spTree>
+    <p:extLst>
+      <p:ext uri="{BB962C8B-B14F-4D97-AF65-F5344CB8AC3E}">
+        <p14:creationId xmlns:p14="http://schemas.microsoft.com/office/powerpoint/2010/main" val="3931016456"/>
+      </p:ext>
+    </p:extLst>
+  </p:cSld>
+  <p:clrMapOvr>
+    <a:masterClrMapping/>
+  </p:clrMapOvr>
+  <p:timing>
+    <p:tnLst>
+      <p:par>
+        <p:cTn id="1" dur="indefinite" restart="never" nodeType="tmRoot"/>
+      </p:par>
+    </p:tnLst>
+  </p:timing>
+</p:sld>
+</file>
+
+<file path=ppt/slides/slide11.xml><?xml version="1.0" encoding="utf-8"?>
 <p:sld xmlns:a="http://schemas.openxmlformats.org/drawingml/2006/main" xmlns:r="http://schemas.openxmlformats.org/officeDocument/2006/relationships" xmlns:p="http://schemas.openxmlformats.org/presentationml/2006/main">
   <p:cSld>
     <p:spTree>
@@ -21479,10 +21633,17 @@
   <p:clrMapOvr>
     <a:masterClrMapping/>
   </p:clrMapOvr>
+  <p:timing>
+    <p:tnLst>
+      <p:par>
+        <p:cTn id="1" dur="indefinite" restart="never" nodeType="tmRoot"/>
+      </p:par>
+    </p:tnLst>
+  </p:timing>
 </p:sld>
 </file>
 
-<file path=ppt/slides/slide11.xml><?xml version="1.0" encoding="utf-8"?>
+<file path=ppt/slides/slide12.xml><?xml version="1.0" encoding="utf-8"?>
 <p:sld xmlns:a="http://schemas.openxmlformats.org/drawingml/2006/main" xmlns:r="http://schemas.openxmlformats.org/officeDocument/2006/relationships" xmlns:p="http://schemas.openxmlformats.org/presentationml/2006/main">
   <p:cSld>
     <p:spTree>
@@ -21499,25 +21660,6 @@
           <a:chExt cx="0" cy="0"/>
         </a:xfrm>
       </p:grpSpPr>
-      <p:sp>
-        <p:nvSpPr>
-          <p:cNvPr id="2" name="Title 1"/>
-          <p:cNvSpPr>
-            <a:spLocks noGrp="1"/>
-          </p:cNvSpPr>
-          <p:nvPr>
-            <p:ph type="title"/>
-          </p:nvPr>
-        </p:nvSpPr>
-        <p:spPr/>
-        <p:txBody>
-          <a:bodyPr/>
-          <a:lstStyle/>
-          <a:p>
-            <a:endParaRPr lang="en-US"/>
-          </a:p>
-        </p:txBody>
-      </p:sp>
       <p:pic>
         <p:nvPicPr>
           <p:cNvPr id="4" name="Picture 3"/>
@@ -21534,8 +21676,56 @@
         </p:blipFill>
         <p:spPr>
           <a:xfrm>
-            <a:off x="3015762" y="1801811"/>
+            <a:off x="211016" y="1028087"/>
             <a:ext cx="5880404" cy="4940028"/>
+          </a:xfrm>
+          <a:prstGeom prst="rect">
+            <a:avLst/>
+          </a:prstGeom>
+        </p:spPr>
+      </p:pic>
+      <p:pic>
+        <p:nvPicPr>
+          <p:cNvPr id="3" name="Picture 2"/>
+          <p:cNvPicPr>
+            <a:picLocks noChangeAspect="1"/>
+          </p:cNvPicPr>
+          <p:nvPr/>
+        </p:nvPicPr>
+        <p:blipFill>
+          <a:blip r:embed="rId3"/>
+          <a:stretch>
+            <a:fillRect/>
+          </a:stretch>
+        </p:blipFill>
+        <p:spPr>
+          <a:xfrm>
+            <a:off x="7370394" y="0"/>
+            <a:ext cx="4077923" cy="3560885"/>
+          </a:xfrm>
+          <a:prstGeom prst="rect">
+            <a:avLst/>
+          </a:prstGeom>
+        </p:spPr>
+      </p:pic>
+      <p:pic>
+        <p:nvPicPr>
+          <p:cNvPr id="5" name="Picture 4"/>
+          <p:cNvPicPr>
+            <a:picLocks noChangeAspect="1"/>
+          </p:cNvPicPr>
+          <p:nvPr/>
+        </p:nvPicPr>
+        <p:blipFill>
+          <a:blip r:embed="rId4"/>
+          <a:stretch>
+            <a:fillRect/>
+          </a:stretch>
+        </p:blipFill>
+        <p:spPr>
+          <a:xfrm>
+            <a:off x="7631723" y="3505587"/>
+            <a:ext cx="3816594" cy="3352413"/>
           </a:xfrm>
           <a:prstGeom prst="rect">
             <a:avLst/>
@@ -21552,6 +21742,158 @@
   <p:clrMapOvr>
     <a:masterClrMapping/>
   </p:clrMapOvr>
+  <p:timing>
+    <p:tnLst>
+      <p:par>
+        <p:cTn id="1" dur="indefinite" restart="never" nodeType="tmRoot"/>
+      </p:par>
+    </p:tnLst>
+  </p:timing>
+</p:sld>
+</file>
+
+<file path=ppt/slides/slide13.xml><?xml version="1.0" encoding="utf-8"?>
+<p:sld xmlns:a="http://schemas.openxmlformats.org/drawingml/2006/main" xmlns:r="http://schemas.openxmlformats.org/officeDocument/2006/relationships" xmlns:p="http://schemas.openxmlformats.org/presentationml/2006/main">
+  <p:cSld>
+    <p:spTree>
+      <p:nvGrpSpPr>
+        <p:cNvPr id="1" name=""/>
+        <p:cNvGrpSpPr/>
+        <p:nvPr/>
+      </p:nvGrpSpPr>
+      <p:grpSpPr>
+        <a:xfrm>
+          <a:off x="0" y="0"/>
+          <a:ext cx="0" cy="0"/>
+          <a:chOff x="0" y="0"/>
+          <a:chExt cx="0" cy="0"/>
+        </a:xfrm>
+      </p:grpSpPr>
+      <p:pic>
+        <p:nvPicPr>
+          <p:cNvPr id="4" name="Picture 3"/>
+          <p:cNvPicPr>
+            <a:picLocks noChangeAspect="1"/>
+          </p:cNvPicPr>
+          <p:nvPr/>
+        </p:nvPicPr>
+        <p:blipFill>
+          <a:blip r:embed="rId2"/>
+          <a:stretch>
+            <a:fillRect/>
+          </a:stretch>
+        </p:blipFill>
+        <p:spPr>
+          <a:xfrm>
+            <a:off x="422030" y="1420323"/>
+            <a:ext cx="5830033" cy="4631069"/>
+          </a:xfrm>
+          <a:prstGeom prst="rect">
+            <a:avLst/>
+          </a:prstGeom>
+        </p:spPr>
+      </p:pic>
+      <p:sp>
+        <p:nvSpPr>
+          <p:cNvPr id="5" name="TextBox 4"/>
+          <p:cNvSpPr txBox="1"/>
+          <p:nvPr/>
+        </p:nvSpPr>
+        <p:spPr>
+          <a:xfrm>
+            <a:off x="2145323" y="870438"/>
+            <a:ext cx="1872564" cy="369332"/>
+          </a:xfrm>
+          <a:prstGeom prst="rect">
+            <a:avLst/>
+          </a:prstGeom>
+          <a:noFill/>
+        </p:spPr>
+        <p:txBody>
+          <a:bodyPr wrap="none" rtlCol="0">
+            <a:spAutoFit/>
+          </a:bodyPr>
+          <a:lstStyle/>
+          <a:p>
+            <a:r>
+              <a:rPr lang="en-US" dirty="0" smtClean="0"/>
+              <a:t>+2 $/kg H2 for NG</a:t>
+            </a:r>
+            <a:endParaRPr lang="en-US" dirty="0"/>
+          </a:p>
+        </p:txBody>
+      </p:sp>
+      <p:pic>
+        <p:nvPicPr>
+          <p:cNvPr id="6" name="Picture 5"/>
+          <p:cNvPicPr>
+            <a:picLocks noChangeAspect="1"/>
+          </p:cNvPicPr>
+          <p:nvPr/>
+        </p:nvPicPr>
+        <p:blipFill>
+          <a:blip r:embed="rId3"/>
+          <a:stretch>
+            <a:fillRect/>
+          </a:stretch>
+        </p:blipFill>
+        <p:spPr>
+          <a:xfrm>
+            <a:off x="6252063" y="1333952"/>
+            <a:ext cx="5687489" cy="4717440"/>
+          </a:xfrm>
+          <a:prstGeom prst="rect">
+            <a:avLst/>
+          </a:prstGeom>
+        </p:spPr>
+      </p:pic>
+      <p:sp>
+        <p:nvSpPr>
+          <p:cNvPr id="7" name="TextBox 6"/>
+          <p:cNvSpPr txBox="1"/>
+          <p:nvPr/>
+        </p:nvSpPr>
+        <p:spPr>
+          <a:xfrm>
+            <a:off x="7418951" y="964620"/>
+            <a:ext cx="3553850" cy="369332"/>
+          </a:xfrm>
+          <a:prstGeom prst="rect">
+            <a:avLst/>
+          </a:prstGeom>
+          <a:noFill/>
+        </p:spPr>
+        <p:txBody>
+          <a:bodyPr wrap="square" rtlCol="0">
+            <a:spAutoFit/>
+          </a:bodyPr>
+          <a:lstStyle/>
+          <a:p>
+            <a:r>
+              <a:rPr lang="en-US" dirty="0" smtClean="0"/>
+              <a:t>- 0.1 *CAP_WIND for EL price</a:t>
+            </a:r>
+            <a:endParaRPr lang="en-US" dirty="0"/>
+          </a:p>
+        </p:txBody>
+      </p:sp>
+    </p:spTree>
+    <p:extLst>
+      <p:ext uri="{BB962C8B-B14F-4D97-AF65-F5344CB8AC3E}">
+        <p14:creationId xmlns:p14="http://schemas.microsoft.com/office/powerpoint/2010/main" val="3451261619"/>
+      </p:ext>
+    </p:extLst>
+  </p:cSld>
+  <p:clrMapOvr>
+    <a:masterClrMapping/>
+  </p:clrMapOvr>
+  <p:timing>
+    <p:tnLst>
+      <p:par>
+        <p:cTn id="1" dur="indefinite" restart="never" nodeType="tmRoot"/>
+      </p:par>
+    </p:tnLst>
+  </p:timing>
 </p:sld>
 </file>
 
@@ -21817,6 +22159,13 @@
   <p:clrMapOvr>
     <a:masterClrMapping/>
   </p:clrMapOvr>
+  <p:timing>
+    <p:tnLst>
+      <p:par>
+        <p:cTn id="1" dur="indefinite" restart="never" nodeType="tmRoot"/>
+      </p:par>
+    </p:tnLst>
+  </p:timing>
 </p:sld>
 </file>
 
@@ -22325,6 +22674,13 @@
   <p:clrMapOvr>
     <a:masterClrMapping/>
   </p:clrMapOvr>
+  <p:timing>
+    <p:tnLst>
+      <p:par>
+        <p:cTn id="1" dur="indefinite" restart="never" nodeType="tmRoot"/>
+      </p:par>
+    </p:tnLst>
+  </p:timing>
 </p:sld>
 </file>
 
@@ -23307,6 +23663,13 @@
   <p:clrMapOvr>
     <a:masterClrMapping/>
   </p:clrMapOvr>
+  <p:timing>
+    <p:tnLst>
+      <p:par>
+        <p:cTn id="1" dur="indefinite" restart="never" nodeType="tmRoot"/>
+      </p:par>
+    </p:tnLst>
+  </p:timing>
 </p:sld>
 </file>
 
@@ -25122,6 +25485,13 @@
   <p:clrMapOvr>
     <a:masterClrMapping/>
   </p:clrMapOvr>
+  <p:timing>
+    <p:tnLst>
+      <p:par>
+        <p:cTn id="1" dur="indefinite" restart="never" nodeType="tmRoot"/>
+      </p:par>
+    </p:tnLst>
+  </p:timing>
 </p:sld>
 </file>
 
@@ -25366,6 +25736,13 @@
   <p:clrMapOvr>
     <a:masterClrMapping/>
   </p:clrMapOvr>
+  <p:timing>
+    <p:tnLst>
+      <p:par>
+        <p:cTn id="1" dur="indefinite" restart="never" nodeType="tmRoot"/>
+      </p:par>
+    </p:tnLst>
+  </p:timing>
 </p:sld>
 </file>
 
@@ -27180,6 +27557,13 @@
   <p:clrMapOvr>
     <a:masterClrMapping/>
   </p:clrMapOvr>
+  <p:timing>
+    <p:tnLst>
+      <p:par>
+        <p:cTn id="1" dur="indefinite" restart="never" nodeType="tmRoot"/>
+      </p:par>
+    </p:tnLst>
+  </p:timing>
 </p:sld>
 </file>
 
@@ -27310,6 +27694,13 @@
   <p:clrMapOvr>
     <a:masterClrMapping/>
   </p:clrMapOvr>
+  <p:timing>
+    <p:tnLst>
+      <p:par>
+        <p:cTn id="1" dur="indefinite" restart="never" nodeType="tmRoot"/>
+      </p:par>
+    </p:tnLst>
+  </p:timing>
 </p:sld>
 </file>
 
@@ -27435,6 +27826,13 @@
   <p:clrMapOvr>
     <a:masterClrMapping/>
   </p:clrMapOvr>
+  <p:timing>
+    <p:tnLst>
+      <p:par>
+        <p:cTn id="1" dur="indefinite" restart="never" nodeType="tmRoot"/>
+      </p:par>
+    </p:tnLst>
+  </p:timing>
 </p:sld>
 </file>
 

</xml_diff>

<commit_message>
Working on investment model formulation, input data is ready.
</commit_message>
<xml_diff>
--- a/results/results.pptx
+++ b/results/results.pptx
@@ -6,18 +6,20 @@
   </p:sldMasterIdLst>
   <p:sldIdLst>
     <p:sldId id="256" r:id="rId2"/>
-    <p:sldId id="263" r:id="rId3"/>
-    <p:sldId id="260" r:id="rId4"/>
-    <p:sldId id="257" r:id="rId5"/>
-    <p:sldId id="259" r:id="rId6"/>
-    <p:sldId id="258" r:id="rId7"/>
-    <p:sldId id="262" r:id="rId8"/>
-    <p:sldId id="261" r:id="rId9"/>
-    <p:sldId id="264" r:id="rId10"/>
-    <p:sldId id="267" r:id="rId11"/>
-    <p:sldId id="265" r:id="rId12"/>
-    <p:sldId id="266" r:id="rId13"/>
-    <p:sldId id="268" r:id="rId14"/>
+    <p:sldId id="270" r:id="rId3"/>
+    <p:sldId id="263" r:id="rId4"/>
+    <p:sldId id="260" r:id="rId5"/>
+    <p:sldId id="257" r:id="rId6"/>
+    <p:sldId id="259" r:id="rId7"/>
+    <p:sldId id="258" r:id="rId8"/>
+    <p:sldId id="262" r:id="rId9"/>
+    <p:sldId id="261" r:id="rId10"/>
+    <p:sldId id="264" r:id="rId11"/>
+    <p:sldId id="267" r:id="rId12"/>
+    <p:sldId id="265" r:id="rId13"/>
+    <p:sldId id="266" r:id="rId14"/>
+    <p:sldId id="268" r:id="rId15"/>
+    <p:sldId id="269" r:id="rId16"/>
   </p:sldIdLst>
   <p:sldSz cx="12192000" cy="6858000"/>
   <p:notesSz cx="6858000" cy="9144000"/>
@@ -366,7 +368,7 @@
           <c:smooth val="0"/>
           <c:extLst>
             <c:ext xmlns:c16="http://schemas.microsoft.com/office/drawing/2014/chart" uri="{C3380CC4-5D6E-409C-BE32-E72D297353CC}">
-              <c16:uniqueId val="{00000000-CC61-4911-98A3-5D1C87A7DAC1}"/>
+              <c16:uniqueId val="{00000000-A3CA-450C-B22C-94F7B9FC5131}"/>
             </c:ext>
           </c:extLst>
         </c:ser>
@@ -6520,6 +6522,463 @@
 </file>
 
 <file path=ppt/charts/chart7.xml><?xml version="1.0" encoding="utf-8"?>
+<c:chartSpace xmlns:c="http://schemas.openxmlformats.org/drawingml/2006/chart" xmlns:a="http://schemas.openxmlformats.org/drawingml/2006/main" xmlns:r="http://schemas.openxmlformats.org/officeDocument/2006/relationships" xmlns:c16r2="http://schemas.microsoft.com/office/drawing/2015/06/chart">
+  <c:date1904 val="0"/>
+  <c:lang val="en-US"/>
+  <c:roundedCorners val="0"/>
+  <mc:AlternateContent xmlns:mc="http://schemas.openxmlformats.org/markup-compatibility/2006">
+    <mc:Choice xmlns:c14="http://schemas.microsoft.com/office/drawing/2007/8/2/chart" Requires="c14">
+      <c14:style val="102"/>
+    </mc:Choice>
+    <mc:Fallback>
+      <c:style val="2"/>
+    </mc:Fallback>
+  </mc:AlternateContent>
+  <c:chart>
+    <c:title>
+      <c:tx>
+        <c:rich>
+          <a:bodyPr rot="0" spcFirstLastPara="1" vertOverflow="ellipsis" vert="horz" wrap="square" anchor="ctr" anchorCtr="1"/>
+          <a:lstStyle/>
+          <a:p>
+            <a:pPr>
+              <a:defRPr sz="1400" b="0" i="0" u="none" strike="noStrike" kern="1200" spc="0" baseline="0">
+                <a:solidFill>
+                  <a:schemeClr val="tx1">
+                    <a:lumMod val="65000"/>
+                    <a:lumOff val="35000"/>
+                  </a:schemeClr>
+                </a:solidFill>
+                <a:latin typeface="+mn-lt"/>
+                <a:ea typeface="+mn-ea"/>
+                <a:cs typeface="+mn-cs"/>
+              </a:defRPr>
+            </a:pPr>
+            <a:r>
+              <a:rPr lang="en-US"/>
+              <a:t>Industrial</a:t>
+            </a:r>
+            <a:r>
+              <a:rPr lang="en-US" baseline="0"/>
+              <a:t> Level Wind Power</a:t>
+            </a:r>
+            <a:endParaRPr lang="en-US"/>
+          </a:p>
+        </c:rich>
+      </c:tx>
+      <c:layout/>
+      <c:overlay val="0"/>
+      <c:spPr>
+        <a:noFill/>
+        <a:ln>
+          <a:noFill/>
+        </a:ln>
+        <a:effectLst/>
+      </c:spPr>
+      <c:txPr>
+        <a:bodyPr rot="0" spcFirstLastPara="1" vertOverflow="ellipsis" vert="horz" wrap="square" anchor="ctr" anchorCtr="1"/>
+        <a:lstStyle/>
+        <a:p>
+          <a:pPr>
+            <a:defRPr sz="1400" b="0" i="0" u="none" strike="noStrike" kern="1200" spc="0" baseline="0">
+              <a:solidFill>
+                <a:schemeClr val="tx1">
+                  <a:lumMod val="65000"/>
+                  <a:lumOff val="35000"/>
+                </a:schemeClr>
+              </a:solidFill>
+              <a:latin typeface="+mn-lt"/>
+              <a:ea typeface="+mn-ea"/>
+              <a:cs typeface="+mn-cs"/>
+            </a:defRPr>
+          </a:pPr>
+          <a:endParaRPr lang="en-US"/>
+        </a:p>
+      </c:txPr>
+    </c:title>
+    <c:autoTitleDeleted val="0"/>
+    <c:plotArea>
+      <c:layout/>
+      <c:lineChart>
+        <c:grouping val="standard"/>
+        <c:varyColors val="0"/>
+        <c:ser>
+          <c:idx val="0"/>
+          <c:order val="0"/>
+          <c:spPr>
+            <a:ln w="28575" cap="rnd">
+              <a:solidFill>
+                <a:schemeClr val="accent1"/>
+              </a:solidFill>
+              <a:round/>
+            </a:ln>
+            <a:effectLst/>
+          </c:spPr>
+          <c:marker>
+            <c:symbol val="none"/>
+          </c:marker>
+          <c:cat>
+            <c:strRef>
+              <c:f>'[existcapacity_annual.xls]Existing Capacity'!$A$9119:$A$40901</c:f>
+              <c:strCache>
+                <c:ptCount val="21"/>
+                <c:pt idx="0">
+                  <c:v>1996</c:v>
+                </c:pt>
+                <c:pt idx="1">
+                  <c:v>1997</c:v>
+                </c:pt>
+                <c:pt idx="2">
+                  <c:v>1998</c:v>
+                </c:pt>
+                <c:pt idx="3">
+                  <c:v>1999</c:v>
+                </c:pt>
+                <c:pt idx="4">
+                  <c:v>2000</c:v>
+                </c:pt>
+                <c:pt idx="5">
+                  <c:v>2001</c:v>
+                </c:pt>
+                <c:pt idx="6">
+                  <c:v>2002</c:v>
+                </c:pt>
+                <c:pt idx="7">
+                  <c:v>2003</c:v>
+                </c:pt>
+                <c:pt idx="8">
+                  <c:v>2004</c:v>
+                </c:pt>
+                <c:pt idx="9">
+                  <c:v>2005</c:v>
+                </c:pt>
+                <c:pt idx="10">
+                  <c:v>2006</c:v>
+                </c:pt>
+                <c:pt idx="11">
+                  <c:v>2007</c:v>
+                </c:pt>
+                <c:pt idx="12">
+                  <c:v>2008</c:v>
+                </c:pt>
+                <c:pt idx="13">
+                  <c:v>2009</c:v>
+                </c:pt>
+                <c:pt idx="14">
+                  <c:v>2010</c:v>
+                </c:pt>
+                <c:pt idx="15">
+                  <c:v>2011</c:v>
+                </c:pt>
+                <c:pt idx="16">
+                  <c:v>2012</c:v>
+                </c:pt>
+                <c:pt idx="17">
+                  <c:v>2013</c:v>
+                </c:pt>
+                <c:pt idx="18">
+                  <c:v>2014</c:v>
+                </c:pt>
+                <c:pt idx="19">
+                  <c:v>2015</c:v>
+                </c:pt>
+                <c:pt idx="20">
+                  <c:v>2016</c:v>
+                </c:pt>
+              </c:strCache>
+            </c:strRef>
+          </c:cat>
+          <c:val>
+            <c:numRef>
+              <c:f>'[existcapacity_annual.xls]Existing Capacity'!$G$9119:$G$40600</c:f>
+              <c:numCache>
+                <c:formatCode>#\ ###.0</c:formatCode>
+                <c:ptCount val="21"/>
+                <c:pt idx="0">
+                  <c:v>33.6</c:v>
+                </c:pt>
+                <c:pt idx="1">
+                  <c:v>33.6</c:v>
+                </c:pt>
+                <c:pt idx="2">
+                  <c:v>33.6</c:v>
+                </c:pt>
+                <c:pt idx="3">
+                  <c:v>172.92</c:v>
+                </c:pt>
+                <c:pt idx="4">
+                  <c:v>173</c:v>
+                </c:pt>
+                <c:pt idx="5">
+                  <c:v>925</c:v>
+                </c:pt>
+                <c:pt idx="6">
+                  <c:v>1085</c:v>
+                </c:pt>
+                <c:pt idx="7">
+                  <c:v>1286</c:v>
+                </c:pt>
+                <c:pt idx="8">
+                  <c:v>1286</c:v>
+                </c:pt>
+                <c:pt idx="9">
+                  <c:v>1755</c:v>
+                </c:pt>
+                <c:pt idx="10">
+                  <c:v>2738</c:v>
+                </c:pt>
+                <c:pt idx="11">
+                  <c:v>4490</c:v>
+                </c:pt>
+                <c:pt idx="12">
+                  <c:v>7431</c:v>
+                </c:pt>
+                <c:pt idx="13">
+                  <c:v>9384</c:v>
+                </c:pt>
+                <c:pt idx="14">
+                  <c:v>9958</c:v>
+                </c:pt>
+                <c:pt idx="15">
+                  <c:v>10367.4</c:v>
+                </c:pt>
+                <c:pt idx="16">
+                  <c:v>12185</c:v>
+                </c:pt>
+                <c:pt idx="17">
+                  <c:v>12328</c:v>
+                </c:pt>
+                <c:pt idx="18">
+                  <c:v>14000.2</c:v>
+                </c:pt>
+                <c:pt idx="19">
+                  <c:v>17664</c:v>
+                </c:pt>
+                <c:pt idx="20">
+                  <c:v>20187.8</c:v>
+                </c:pt>
+              </c:numCache>
+            </c:numRef>
+          </c:val>
+          <c:smooth val="0"/>
+          <c:extLst>
+            <c:ext xmlns:c16="http://schemas.microsoft.com/office/drawing/2014/chart" uri="{C3380CC4-5D6E-409C-BE32-E72D297353CC}">
+              <c16:uniqueId val="{00000000-9382-42DD-971C-E1E7715BB141}"/>
+            </c:ext>
+          </c:extLst>
+        </c:ser>
+        <c:dLbls>
+          <c:showLegendKey val="0"/>
+          <c:showVal val="0"/>
+          <c:showCatName val="0"/>
+          <c:showSerName val="0"/>
+          <c:showPercent val="0"/>
+          <c:showBubbleSize val="0"/>
+        </c:dLbls>
+        <c:smooth val="0"/>
+        <c:axId val="1591158831"/>
+        <c:axId val="1591170895"/>
+      </c:lineChart>
+      <c:catAx>
+        <c:axId val="1591158831"/>
+        <c:scaling>
+          <c:orientation val="minMax"/>
+        </c:scaling>
+        <c:delete val="0"/>
+        <c:axPos val="b"/>
+        <c:numFmt formatCode="General" sourceLinked="1"/>
+        <c:majorTickMark val="none"/>
+        <c:minorTickMark val="none"/>
+        <c:tickLblPos val="nextTo"/>
+        <c:spPr>
+          <a:noFill/>
+          <a:ln w="9525" cap="flat" cmpd="sng" algn="ctr">
+            <a:solidFill>
+              <a:schemeClr val="tx1">
+                <a:lumMod val="15000"/>
+                <a:lumOff val="85000"/>
+              </a:schemeClr>
+            </a:solidFill>
+            <a:round/>
+          </a:ln>
+          <a:effectLst/>
+        </c:spPr>
+        <c:txPr>
+          <a:bodyPr rot="-60000000" spcFirstLastPara="1" vertOverflow="ellipsis" vert="horz" wrap="square" anchor="ctr" anchorCtr="1"/>
+          <a:lstStyle/>
+          <a:p>
+            <a:pPr>
+              <a:defRPr sz="900" b="0" i="0" u="none" strike="noStrike" kern="1200" baseline="0">
+                <a:solidFill>
+                  <a:schemeClr val="tx1">
+                    <a:lumMod val="65000"/>
+                    <a:lumOff val="35000"/>
+                  </a:schemeClr>
+                </a:solidFill>
+                <a:latin typeface="+mn-lt"/>
+                <a:ea typeface="+mn-ea"/>
+                <a:cs typeface="+mn-cs"/>
+              </a:defRPr>
+            </a:pPr>
+            <a:endParaRPr lang="en-US"/>
+          </a:p>
+        </c:txPr>
+        <c:crossAx val="1591170895"/>
+        <c:crosses val="autoZero"/>
+        <c:auto val="1"/>
+        <c:lblAlgn val="ctr"/>
+        <c:lblOffset val="100"/>
+        <c:noMultiLvlLbl val="0"/>
+      </c:catAx>
+      <c:valAx>
+        <c:axId val="1591170895"/>
+        <c:scaling>
+          <c:orientation val="minMax"/>
+        </c:scaling>
+        <c:delete val="0"/>
+        <c:axPos val="l"/>
+        <c:majorGridlines>
+          <c:spPr>
+            <a:ln w="9525" cap="flat" cmpd="sng" algn="ctr">
+              <a:solidFill>
+                <a:schemeClr val="tx1">
+                  <a:lumMod val="15000"/>
+                  <a:lumOff val="85000"/>
+                </a:schemeClr>
+              </a:solidFill>
+              <a:round/>
+            </a:ln>
+            <a:effectLst/>
+          </c:spPr>
+        </c:majorGridlines>
+        <c:title>
+          <c:tx>
+            <c:rich>
+              <a:bodyPr rot="-5400000" spcFirstLastPara="1" vertOverflow="ellipsis" vert="horz" wrap="square" anchor="ctr" anchorCtr="1"/>
+              <a:lstStyle/>
+              <a:p>
+                <a:pPr>
+                  <a:defRPr sz="1000" b="0" i="0" u="none" strike="noStrike" kern="1200" baseline="0">
+                    <a:solidFill>
+                      <a:schemeClr val="tx1">
+                        <a:lumMod val="65000"/>
+                        <a:lumOff val="35000"/>
+                      </a:schemeClr>
+                    </a:solidFill>
+                    <a:latin typeface="+mn-lt"/>
+                    <a:ea typeface="+mn-ea"/>
+                    <a:cs typeface="+mn-cs"/>
+                  </a:defRPr>
+                </a:pPr>
+                <a:r>
+                  <a:rPr lang="en-US" dirty="0" smtClean="0"/>
+                  <a:t>Installed Capacity [MW]</a:t>
+                </a:r>
+                <a:endParaRPr lang="en-US" dirty="0"/>
+              </a:p>
+            </c:rich>
+          </c:tx>
+          <c:layout/>
+          <c:overlay val="0"/>
+          <c:spPr>
+            <a:noFill/>
+            <a:ln>
+              <a:noFill/>
+            </a:ln>
+            <a:effectLst/>
+          </c:spPr>
+          <c:txPr>
+            <a:bodyPr rot="-5400000" spcFirstLastPara="1" vertOverflow="ellipsis" vert="horz" wrap="square" anchor="ctr" anchorCtr="1"/>
+            <a:lstStyle/>
+            <a:p>
+              <a:pPr>
+                <a:defRPr sz="1000" b="0" i="0" u="none" strike="noStrike" kern="1200" baseline="0">
+                  <a:solidFill>
+                    <a:schemeClr val="tx1">
+                      <a:lumMod val="65000"/>
+                      <a:lumOff val="35000"/>
+                    </a:schemeClr>
+                  </a:solidFill>
+                  <a:latin typeface="+mn-lt"/>
+                  <a:ea typeface="+mn-ea"/>
+                  <a:cs typeface="+mn-cs"/>
+                </a:defRPr>
+              </a:pPr>
+              <a:endParaRPr lang="en-US"/>
+            </a:p>
+          </c:txPr>
+        </c:title>
+        <c:numFmt formatCode="#\ ###" sourceLinked="0"/>
+        <c:majorTickMark val="none"/>
+        <c:minorTickMark val="none"/>
+        <c:tickLblPos val="nextTo"/>
+        <c:spPr>
+          <a:noFill/>
+          <a:ln>
+            <a:noFill/>
+          </a:ln>
+          <a:effectLst/>
+        </c:spPr>
+        <c:txPr>
+          <a:bodyPr rot="-60000000" spcFirstLastPara="1" vertOverflow="ellipsis" vert="horz" wrap="square" anchor="ctr" anchorCtr="1"/>
+          <a:lstStyle/>
+          <a:p>
+            <a:pPr>
+              <a:defRPr sz="900" b="0" i="0" u="none" strike="noStrike" kern="1200" baseline="0">
+                <a:solidFill>
+                  <a:schemeClr val="tx1">
+                    <a:lumMod val="65000"/>
+                    <a:lumOff val="35000"/>
+                  </a:schemeClr>
+                </a:solidFill>
+                <a:latin typeface="+mn-lt"/>
+                <a:ea typeface="+mn-ea"/>
+                <a:cs typeface="+mn-cs"/>
+              </a:defRPr>
+            </a:pPr>
+            <a:endParaRPr lang="en-US"/>
+          </a:p>
+        </c:txPr>
+        <c:crossAx val="1591158831"/>
+        <c:crosses val="autoZero"/>
+        <c:crossBetween val="between"/>
+      </c:valAx>
+      <c:spPr>
+        <a:noFill/>
+        <a:ln>
+          <a:noFill/>
+        </a:ln>
+        <a:effectLst/>
+      </c:spPr>
+    </c:plotArea>
+    <c:plotVisOnly val="1"/>
+    <c:dispBlanksAs val="gap"/>
+    <c:showDLblsOverMax val="0"/>
+  </c:chart>
+  <c:spPr>
+    <a:noFill/>
+    <a:ln>
+      <a:noFill/>
+    </a:ln>
+    <a:effectLst/>
+  </c:spPr>
+  <c:txPr>
+    <a:bodyPr/>
+    <a:lstStyle/>
+    <a:p>
+      <a:pPr>
+        <a:defRPr/>
+      </a:pPr>
+      <a:endParaRPr lang="en-US"/>
+    </a:p>
+  </c:txPr>
+  <c:externalData r:id="rId3">
+    <c:autoUpdate val="0"/>
+  </c:externalData>
+</c:chartSpace>
+</file>
+
+<file path=ppt/charts/chart8.xml><?xml version="1.0" encoding="utf-8"?>
 <c:chartSpace xmlns:c="http://schemas.openxmlformats.org/drawingml/2006/chart" xmlns:a="http://schemas.openxmlformats.org/drawingml/2006/main" xmlns:r="http://schemas.openxmlformats.org/officeDocument/2006/relationships" xmlns:c16r2="http://schemas.microsoft.com/office/drawing/2015/06/chart">
   <c:date1904 val="0"/>
   <c:lang val="en-US"/>
@@ -7682,6 +8141,46 @@
 </file>
 
 <file path=ppt/charts/colors7.xml><?xml version="1.0" encoding="utf-8"?>
+<cs:colorStyle xmlns:cs="http://schemas.microsoft.com/office/drawing/2012/chartStyle" xmlns:a="http://schemas.openxmlformats.org/drawingml/2006/main" meth="cycle" id="10">
+  <a:schemeClr val="accent1"/>
+  <a:schemeClr val="accent2"/>
+  <a:schemeClr val="accent3"/>
+  <a:schemeClr val="accent4"/>
+  <a:schemeClr val="accent5"/>
+  <a:schemeClr val="accent6"/>
+  <cs:variation/>
+  <cs:variation>
+    <a:lumMod val="60000"/>
+  </cs:variation>
+  <cs:variation>
+    <a:lumMod val="80000"/>
+    <a:lumOff val="20000"/>
+  </cs:variation>
+  <cs:variation>
+    <a:lumMod val="80000"/>
+  </cs:variation>
+  <cs:variation>
+    <a:lumMod val="60000"/>
+    <a:lumOff val="40000"/>
+  </cs:variation>
+  <cs:variation>
+    <a:lumMod val="50000"/>
+  </cs:variation>
+  <cs:variation>
+    <a:lumMod val="70000"/>
+    <a:lumOff val="30000"/>
+  </cs:variation>
+  <cs:variation>
+    <a:lumMod val="70000"/>
+  </cs:variation>
+  <cs:variation>
+    <a:lumMod val="50000"/>
+    <a:lumOff val="50000"/>
+  </cs:variation>
+</cs:colorStyle>
+</file>
+
+<file path=ppt/charts/colors8.xml><?xml version="1.0" encoding="utf-8"?>
 <cs:colorStyle xmlns:cs="http://schemas.microsoft.com/office/drawing/2012/chartStyle" xmlns:a="http://schemas.openxmlformats.org/drawingml/2006/main" meth="cycle" id="10">
   <a:schemeClr val="accent1"/>
   <a:schemeClr val="accent2"/>
@@ -11300,6 +11799,522 @@
 </cs:chartStyle>
 </file>
 
+<file path=ppt/charts/style8.xml><?xml version="1.0" encoding="utf-8"?>
+<cs:chartStyle xmlns:cs="http://schemas.microsoft.com/office/drawing/2012/chartStyle" xmlns:a="http://schemas.openxmlformats.org/drawingml/2006/main" id="227">
+  <cs:axisTitle>
+    <cs:lnRef idx="0"/>
+    <cs:fillRef idx="0"/>
+    <cs:effectRef idx="0"/>
+    <cs:fontRef idx="minor">
+      <a:schemeClr val="tx1">
+        <a:lumMod val="65000"/>
+        <a:lumOff val="35000"/>
+      </a:schemeClr>
+    </cs:fontRef>
+    <cs:defRPr sz="1000" kern="1200"/>
+  </cs:axisTitle>
+  <cs:categoryAxis>
+    <cs:lnRef idx="0"/>
+    <cs:fillRef idx="0"/>
+    <cs:effectRef idx="0"/>
+    <cs:fontRef idx="minor">
+      <a:schemeClr val="tx1">
+        <a:lumMod val="65000"/>
+        <a:lumOff val="35000"/>
+      </a:schemeClr>
+    </cs:fontRef>
+    <cs:spPr>
+      <a:ln w="9525" cap="flat" cmpd="sng" algn="ctr">
+        <a:solidFill>
+          <a:schemeClr val="tx1">
+            <a:lumMod val="15000"/>
+            <a:lumOff val="85000"/>
+          </a:schemeClr>
+        </a:solidFill>
+        <a:round/>
+      </a:ln>
+    </cs:spPr>
+    <cs:defRPr sz="900" kern="1200"/>
+  </cs:categoryAxis>
+  <cs:chartArea mods="allowNoFillOverride allowNoLineOverride">
+    <cs:lnRef idx="0"/>
+    <cs:fillRef idx="0"/>
+    <cs:effectRef idx="0"/>
+    <cs:fontRef idx="minor">
+      <a:schemeClr val="tx1"/>
+    </cs:fontRef>
+    <cs:spPr>
+      <a:solidFill>
+        <a:schemeClr val="bg1"/>
+      </a:solidFill>
+      <a:ln w="9525" cap="flat" cmpd="sng" algn="ctr">
+        <a:solidFill>
+          <a:schemeClr val="tx1">
+            <a:lumMod val="15000"/>
+            <a:lumOff val="85000"/>
+          </a:schemeClr>
+        </a:solidFill>
+        <a:round/>
+      </a:ln>
+    </cs:spPr>
+    <cs:defRPr sz="1000" kern="1200"/>
+  </cs:chartArea>
+  <cs:dataLabel>
+    <cs:lnRef idx="0"/>
+    <cs:fillRef idx="0"/>
+    <cs:effectRef idx="0"/>
+    <cs:fontRef idx="minor">
+      <a:schemeClr val="tx1">
+        <a:lumMod val="75000"/>
+        <a:lumOff val="25000"/>
+      </a:schemeClr>
+    </cs:fontRef>
+    <cs:defRPr sz="900" kern="1200"/>
+  </cs:dataLabel>
+  <cs:dataLabelCallout>
+    <cs:lnRef idx="0"/>
+    <cs:fillRef idx="0"/>
+    <cs:effectRef idx="0"/>
+    <cs:fontRef idx="minor">
+      <a:schemeClr val="dk1">
+        <a:lumMod val="65000"/>
+        <a:lumOff val="35000"/>
+      </a:schemeClr>
+    </cs:fontRef>
+    <cs:spPr>
+      <a:solidFill>
+        <a:schemeClr val="lt1"/>
+      </a:solidFill>
+      <a:ln>
+        <a:solidFill>
+          <a:schemeClr val="dk1">
+            <a:lumMod val="25000"/>
+            <a:lumOff val="75000"/>
+          </a:schemeClr>
+        </a:solidFill>
+      </a:ln>
+    </cs:spPr>
+    <cs:defRPr sz="900" kern="1200"/>
+    <cs:bodyPr rot="0" spcFirstLastPara="1" vertOverflow="clip" horzOverflow="clip" vert="horz" wrap="square" lIns="36576" tIns="18288" rIns="36576" bIns="18288" anchor="ctr" anchorCtr="1">
+      <a:spAutoFit/>
+    </cs:bodyPr>
+  </cs:dataLabelCallout>
+  <cs:dataPoint>
+    <cs:lnRef idx="0"/>
+    <cs:fillRef idx="1">
+      <cs:styleClr val="auto"/>
+    </cs:fillRef>
+    <cs:effectRef idx="0"/>
+    <cs:fontRef idx="minor">
+      <a:schemeClr val="tx1"/>
+    </cs:fontRef>
+    <cs:spPr>
+      <a:solidFill>
+        <a:schemeClr val="phClr"/>
+      </a:solidFill>
+    </cs:spPr>
+  </cs:dataPoint>
+  <cs:dataPoint3D>
+    <cs:lnRef idx="0"/>
+    <cs:fillRef idx="1">
+      <cs:styleClr val="auto"/>
+    </cs:fillRef>
+    <cs:effectRef idx="0"/>
+    <cs:fontRef idx="minor">
+      <a:schemeClr val="tx1"/>
+    </cs:fontRef>
+    <cs:spPr>
+      <a:solidFill>
+        <a:schemeClr val="phClr"/>
+      </a:solidFill>
+    </cs:spPr>
+  </cs:dataPoint3D>
+  <cs:dataPointLine>
+    <cs:lnRef idx="0">
+      <cs:styleClr val="auto"/>
+    </cs:lnRef>
+    <cs:fillRef idx="1"/>
+    <cs:effectRef idx="0"/>
+    <cs:fontRef idx="minor">
+      <a:schemeClr val="tx1"/>
+    </cs:fontRef>
+    <cs:spPr>
+      <a:ln w="28575" cap="rnd">
+        <a:solidFill>
+          <a:schemeClr val="phClr"/>
+        </a:solidFill>
+        <a:round/>
+      </a:ln>
+    </cs:spPr>
+  </cs:dataPointLine>
+  <cs:dataPointMarker>
+    <cs:lnRef idx="0">
+      <cs:styleClr val="auto"/>
+    </cs:lnRef>
+    <cs:fillRef idx="1">
+      <cs:styleClr val="auto"/>
+    </cs:fillRef>
+    <cs:effectRef idx="0"/>
+    <cs:fontRef idx="minor">
+      <a:schemeClr val="tx1"/>
+    </cs:fontRef>
+    <cs:spPr>
+      <a:solidFill>
+        <a:schemeClr val="phClr"/>
+      </a:solidFill>
+      <a:ln w="9525">
+        <a:solidFill>
+          <a:schemeClr val="phClr"/>
+        </a:solidFill>
+      </a:ln>
+    </cs:spPr>
+  </cs:dataPointMarker>
+  <cs:dataPointMarkerLayout symbol="circle" size="5"/>
+  <cs:dataPointWireframe>
+    <cs:lnRef idx="0">
+      <cs:styleClr val="auto"/>
+    </cs:lnRef>
+    <cs:fillRef idx="1"/>
+    <cs:effectRef idx="0"/>
+    <cs:fontRef idx="minor">
+      <a:schemeClr val="tx1"/>
+    </cs:fontRef>
+    <cs:spPr>
+      <a:ln w="9525" cap="rnd">
+        <a:solidFill>
+          <a:schemeClr val="phClr"/>
+        </a:solidFill>
+        <a:round/>
+      </a:ln>
+    </cs:spPr>
+  </cs:dataPointWireframe>
+  <cs:dataTable>
+    <cs:lnRef idx="0"/>
+    <cs:fillRef idx="0"/>
+    <cs:effectRef idx="0"/>
+    <cs:fontRef idx="minor">
+      <a:schemeClr val="tx1">
+        <a:lumMod val="65000"/>
+        <a:lumOff val="35000"/>
+      </a:schemeClr>
+    </cs:fontRef>
+    <cs:spPr>
+      <a:noFill/>
+      <a:ln w="9525" cap="flat" cmpd="sng" algn="ctr">
+        <a:solidFill>
+          <a:schemeClr val="tx1">
+            <a:lumMod val="15000"/>
+            <a:lumOff val="85000"/>
+          </a:schemeClr>
+        </a:solidFill>
+        <a:round/>
+      </a:ln>
+    </cs:spPr>
+    <cs:defRPr sz="900" kern="1200"/>
+  </cs:dataTable>
+  <cs:downBar>
+    <cs:lnRef idx="0"/>
+    <cs:fillRef idx="0"/>
+    <cs:effectRef idx="0"/>
+    <cs:fontRef idx="minor">
+      <a:schemeClr val="dk1"/>
+    </cs:fontRef>
+    <cs:spPr>
+      <a:solidFill>
+        <a:schemeClr val="dk1">
+          <a:lumMod val="65000"/>
+          <a:lumOff val="35000"/>
+        </a:schemeClr>
+      </a:solidFill>
+      <a:ln w="9525">
+        <a:solidFill>
+          <a:schemeClr val="tx1">
+            <a:lumMod val="65000"/>
+            <a:lumOff val="35000"/>
+          </a:schemeClr>
+        </a:solidFill>
+      </a:ln>
+    </cs:spPr>
+  </cs:downBar>
+  <cs:dropLine>
+    <cs:lnRef idx="0"/>
+    <cs:fillRef idx="0"/>
+    <cs:effectRef idx="0"/>
+    <cs:fontRef idx="minor">
+      <a:schemeClr val="tx1"/>
+    </cs:fontRef>
+    <cs:spPr>
+      <a:ln w="9525" cap="flat" cmpd="sng" algn="ctr">
+        <a:solidFill>
+          <a:schemeClr val="tx1">
+            <a:lumMod val="35000"/>
+            <a:lumOff val="65000"/>
+          </a:schemeClr>
+        </a:solidFill>
+        <a:round/>
+      </a:ln>
+    </cs:spPr>
+  </cs:dropLine>
+  <cs:errorBar>
+    <cs:lnRef idx="0"/>
+    <cs:fillRef idx="0"/>
+    <cs:effectRef idx="0"/>
+    <cs:fontRef idx="minor">
+      <a:schemeClr val="tx1"/>
+    </cs:fontRef>
+    <cs:spPr>
+      <a:ln w="9525" cap="flat" cmpd="sng" algn="ctr">
+        <a:solidFill>
+          <a:schemeClr val="tx1">
+            <a:lumMod val="65000"/>
+            <a:lumOff val="35000"/>
+          </a:schemeClr>
+        </a:solidFill>
+        <a:round/>
+      </a:ln>
+    </cs:spPr>
+  </cs:errorBar>
+  <cs:floor>
+    <cs:lnRef idx="0"/>
+    <cs:fillRef idx="0"/>
+    <cs:effectRef idx="0"/>
+    <cs:fontRef idx="minor">
+      <a:schemeClr val="tx1"/>
+    </cs:fontRef>
+    <cs:spPr>
+      <a:noFill/>
+      <a:ln>
+        <a:noFill/>
+      </a:ln>
+    </cs:spPr>
+  </cs:floor>
+  <cs:gridlineMajor>
+    <cs:lnRef idx="0"/>
+    <cs:fillRef idx="0"/>
+    <cs:effectRef idx="0"/>
+    <cs:fontRef idx="minor">
+      <a:schemeClr val="tx1"/>
+    </cs:fontRef>
+    <cs:spPr>
+      <a:ln w="9525" cap="flat" cmpd="sng" algn="ctr">
+        <a:solidFill>
+          <a:schemeClr val="tx1">
+            <a:lumMod val="15000"/>
+            <a:lumOff val="85000"/>
+          </a:schemeClr>
+        </a:solidFill>
+        <a:round/>
+      </a:ln>
+    </cs:spPr>
+  </cs:gridlineMajor>
+  <cs:gridlineMinor>
+    <cs:lnRef idx="0"/>
+    <cs:fillRef idx="0"/>
+    <cs:effectRef idx="0"/>
+    <cs:fontRef idx="minor">
+      <a:schemeClr val="tx1"/>
+    </cs:fontRef>
+    <cs:spPr>
+      <a:ln w="9525" cap="flat" cmpd="sng" algn="ctr">
+        <a:solidFill>
+          <a:schemeClr val="tx1">
+            <a:lumMod val="5000"/>
+            <a:lumOff val="95000"/>
+          </a:schemeClr>
+        </a:solidFill>
+        <a:round/>
+      </a:ln>
+    </cs:spPr>
+  </cs:gridlineMinor>
+  <cs:hiLoLine>
+    <cs:lnRef idx="0"/>
+    <cs:fillRef idx="0"/>
+    <cs:effectRef idx="0"/>
+    <cs:fontRef idx="minor">
+      <a:schemeClr val="tx1"/>
+    </cs:fontRef>
+    <cs:spPr>
+      <a:ln w="9525" cap="flat" cmpd="sng" algn="ctr">
+        <a:solidFill>
+          <a:schemeClr val="tx1">
+            <a:lumMod val="75000"/>
+            <a:lumOff val="25000"/>
+          </a:schemeClr>
+        </a:solidFill>
+        <a:round/>
+      </a:ln>
+    </cs:spPr>
+  </cs:hiLoLine>
+  <cs:leaderLine>
+    <cs:lnRef idx="0"/>
+    <cs:fillRef idx="0"/>
+    <cs:effectRef idx="0"/>
+    <cs:fontRef idx="minor">
+      <a:schemeClr val="tx1"/>
+    </cs:fontRef>
+    <cs:spPr>
+      <a:ln w="9525" cap="flat" cmpd="sng" algn="ctr">
+        <a:solidFill>
+          <a:schemeClr val="tx1">
+            <a:lumMod val="35000"/>
+            <a:lumOff val="65000"/>
+          </a:schemeClr>
+        </a:solidFill>
+        <a:round/>
+      </a:ln>
+    </cs:spPr>
+  </cs:leaderLine>
+  <cs:legend>
+    <cs:lnRef idx="0"/>
+    <cs:fillRef idx="0"/>
+    <cs:effectRef idx="0"/>
+    <cs:fontRef idx="minor">
+      <a:schemeClr val="tx1">
+        <a:lumMod val="65000"/>
+        <a:lumOff val="35000"/>
+      </a:schemeClr>
+    </cs:fontRef>
+    <cs:defRPr sz="900" kern="1200"/>
+  </cs:legend>
+  <cs:plotArea mods="allowNoFillOverride allowNoLineOverride">
+    <cs:lnRef idx="0"/>
+    <cs:fillRef idx="0"/>
+    <cs:effectRef idx="0"/>
+    <cs:fontRef idx="minor">
+      <a:schemeClr val="tx1"/>
+    </cs:fontRef>
+  </cs:plotArea>
+  <cs:plotArea3D mods="allowNoFillOverride allowNoLineOverride">
+    <cs:lnRef idx="0"/>
+    <cs:fillRef idx="0"/>
+    <cs:effectRef idx="0"/>
+    <cs:fontRef idx="minor">
+      <a:schemeClr val="tx1"/>
+    </cs:fontRef>
+  </cs:plotArea3D>
+  <cs:seriesAxis>
+    <cs:lnRef idx="0"/>
+    <cs:fillRef idx="0"/>
+    <cs:effectRef idx="0"/>
+    <cs:fontRef idx="minor">
+      <a:schemeClr val="tx1">
+        <a:lumMod val="65000"/>
+        <a:lumOff val="35000"/>
+      </a:schemeClr>
+    </cs:fontRef>
+    <cs:defRPr sz="900" kern="1200"/>
+  </cs:seriesAxis>
+  <cs:seriesLine>
+    <cs:lnRef idx="0"/>
+    <cs:fillRef idx="0"/>
+    <cs:effectRef idx="0"/>
+    <cs:fontRef idx="minor">
+      <a:schemeClr val="tx1"/>
+    </cs:fontRef>
+    <cs:spPr>
+      <a:ln w="9525" cap="flat" cmpd="sng" algn="ctr">
+        <a:solidFill>
+          <a:schemeClr val="tx1">
+            <a:lumMod val="35000"/>
+            <a:lumOff val="65000"/>
+          </a:schemeClr>
+        </a:solidFill>
+        <a:round/>
+      </a:ln>
+    </cs:spPr>
+  </cs:seriesLine>
+  <cs:title>
+    <cs:lnRef idx="0"/>
+    <cs:fillRef idx="0"/>
+    <cs:effectRef idx="0"/>
+    <cs:fontRef idx="minor">
+      <a:schemeClr val="tx1">
+        <a:lumMod val="65000"/>
+        <a:lumOff val="35000"/>
+      </a:schemeClr>
+    </cs:fontRef>
+    <cs:defRPr sz="1400" b="0" kern="1200" spc="0" baseline="0"/>
+  </cs:title>
+  <cs:trendline>
+    <cs:lnRef idx="0">
+      <cs:styleClr val="auto"/>
+    </cs:lnRef>
+    <cs:fillRef idx="0"/>
+    <cs:effectRef idx="0"/>
+    <cs:fontRef idx="minor">
+      <a:schemeClr val="tx1"/>
+    </cs:fontRef>
+    <cs:spPr>
+      <a:ln w="19050" cap="rnd">
+        <a:solidFill>
+          <a:schemeClr val="phClr"/>
+        </a:solidFill>
+        <a:prstDash val="sysDot"/>
+      </a:ln>
+    </cs:spPr>
+  </cs:trendline>
+  <cs:trendlineLabel>
+    <cs:lnRef idx="0"/>
+    <cs:fillRef idx="0"/>
+    <cs:effectRef idx="0"/>
+    <cs:fontRef idx="minor">
+      <a:schemeClr val="tx1">
+        <a:lumMod val="65000"/>
+        <a:lumOff val="35000"/>
+      </a:schemeClr>
+    </cs:fontRef>
+    <cs:defRPr sz="900" kern="1200"/>
+  </cs:trendlineLabel>
+  <cs:upBar>
+    <cs:lnRef idx="0"/>
+    <cs:fillRef idx="0"/>
+    <cs:effectRef idx="0"/>
+    <cs:fontRef idx="minor">
+      <a:schemeClr val="dk1"/>
+    </cs:fontRef>
+    <cs:spPr>
+      <a:solidFill>
+        <a:schemeClr val="lt1"/>
+      </a:solidFill>
+      <a:ln w="9525">
+        <a:solidFill>
+          <a:schemeClr val="tx1">
+            <a:lumMod val="15000"/>
+            <a:lumOff val="85000"/>
+          </a:schemeClr>
+        </a:solidFill>
+      </a:ln>
+    </cs:spPr>
+  </cs:upBar>
+  <cs:valueAxis>
+    <cs:lnRef idx="0"/>
+    <cs:fillRef idx="0"/>
+    <cs:effectRef idx="0"/>
+    <cs:fontRef idx="minor">
+      <a:schemeClr val="tx1">
+        <a:lumMod val="65000"/>
+        <a:lumOff val="35000"/>
+      </a:schemeClr>
+    </cs:fontRef>
+    <cs:defRPr sz="900" kern="1200"/>
+  </cs:valueAxis>
+  <cs:wall>
+    <cs:lnRef idx="0"/>
+    <cs:fillRef idx="0"/>
+    <cs:effectRef idx="0"/>
+    <cs:fontRef idx="minor">
+      <a:schemeClr val="tx1"/>
+    </cs:fontRef>
+    <cs:spPr>
+      <a:noFill/>
+      <a:ln>
+        <a:noFill/>
+      </a:ln>
+    </cs:spPr>
+  </cs:wall>
+</cs:chartStyle>
+</file>
+
 <file path=ppt/drawings/drawing1.xml><?xml version="1.0" encoding="utf-8"?>
 <c:userShapes xmlns:c="http://schemas.openxmlformats.org/drawingml/2006/chart">
   <cdr:relSizeAnchor xmlns:cdr="http://schemas.openxmlformats.org/drawingml/2006/chartDrawing">
@@ -18532,7 +19547,7 @@
           <a:p>
             <a:fld id="{9E5279F9-023E-49B1-9FC4-A08662BF525B}" type="datetimeFigureOut">
               <a:rPr lang="en-US" smtClean="0"/>
-              <a:t>4/30/2019</a:t>
+              <a:t>5/20/2019</a:t>
             </a:fld>
             <a:endParaRPr lang="en-US"/>
           </a:p>
@@ -18702,7 +19717,7 @@
           <a:p>
             <a:fld id="{9E5279F9-023E-49B1-9FC4-A08662BF525B}" type="datetimeFigureOut">
               <a:rPr lang="en-US" smtClean="0"/>
-              <a:t>4/30/2019</a:t>
+              <a:t>5/20/2019</a:t>
             </a:fld>
             <a:endParaRPr lang="en-US"/>
           </a:p>
@@ -18882,7 +19897,7 @@
           <a:p>
             <a:fld id="{9E5279F9-023E-49B1-9FC4-A08662BF525B}" type="datetimeFigureOut">
               <a:rPr lang="en-US" smtClean="0"/>
-              <a:t>4/30/2019</a:t>
+              <a:t>5/20/2019</a:t>
             </a:fld>
             <a:endParaRPr lang="en-US"/>
           </a:p>
@@ -19052,7 +20067,7 @@
           <a:p>
             <a:fld id="{9E5279F9-023E-49B1-9FC4-A08662BF525B}" type="datetimeFigureOut">
               <a:rPr lang="en-US" smtClean="0"/>
-              <a:t>4/30/2019</a:t>
+              <a:t>5/20/2019</a:t>
             </a:fld>
             <a:endParaRPr lang="en-US"/>
           </a:p>
@@ -19298,7 +20313,7 @@
           <a:p>
             <a:fld id="{9E5279F9-023E-49B1-9FC4-A08662BF525B}" type="datetimeFigureOut">
               <a:rPr lang="en-US" smtClean="0"/>
-              <a:t>4/30/2019</a:t>
+              <a:t>5/20/2019</a:t>
             </a:fld>
             <a:endParaRPr lang="en-US"/>
           </a:p>
@@ -19530,7 +20545,7 @@
           <a:p>
             <a:fld id="{9E5279F9-023E-49B1-9FC4-A08662BF525B}" type="datetimeFigureOut">
               <a:rPr lang="en-US" smtClean="0"/>
-              <a:t>4/30/2019</a:t>
+              <a:t>5/20/2019</a:t>
             </a:fld>
             <a:endParaRPr lang="en-US"/>
           </a:p>
@@ -19897,7 +20912,7 @@
           <a:p>
             <a:fld id="{9E5279F9-023E-49B1-9FC4-A08662BF525B}" type="datetimeFigureOut">
               <a:rPr lang="en-US" smtClean="0"/>
-              <a:t>4/30/2019</a:t>
+              <a:t>5/20/2019</a:t>
             </a:fld>
             <a:endParaRPr lang="en-US"/>
           </a:p>
@@ -20015,7 +21030,7 @@
           <a:p>
             <a:fld id="{9E5279F9-023E-49B1-9FC4-A08662BF525B}" type="datetimeFigureOut">
               <a:rPr lang="en-US" smtClean="0"/>
-              <a:t>4/30/2019</a:t>
+              <a:t>5/20/2019</a:t>
             </a:fld>
             <a:endParaRPr lang="en-US"/>
           </a:p>
@@ -20110,7 +21125,7 @@
           <a:p>
             <a:fld id="{9E5279F9-023E-49B1-9FC4-A08662BF525B}" type="datetimeFigureOut">
               <a:rPr lang="en-US" smtClean="0"/>
-              <a:t>4/30/2019</a:t>
+              <a:t>5/20/2019</a:t>
             </a:fld>
             <a:endParaRPr lang="en-US"/>
           </a:p>
@@ -20387,7 +21402,7 @@
           <a:p>
             <a:fld id="{9E5279F9-023E-49B1-9FC4-A08662BF525B}" type="datetimeFigureOut">
               <a:rPr lang="en-US" smtClean="0"/>
-              <a:t>4/30/2019</a:t>
+              <a:t>5/20/2019</a:t>
             </a:fld>
             <a:endParaRPr lang="en-US"/>
           </a:p>
@@ -20640,7 +21655,7 @@
           <a:p>
             <a:fld id="{9E5279F9-023E-49B1-9FC4-A08662BF525B}" type="datetimeFigureOut">
               <a:rPr lang="en-US" smtClean="0"/>
-              <a:t>4/30/2019</a:t>
+              <a:t>5/20/2019</a:t>
             </a:fld>
             <a:endParaRPr lang="en-US"/>
           </a:p>
@@ -20853,7 +21868,7 @@
           <a:p>
             <a:fld id="{9E5279F9-023E-49B1-9FC4-A08662BF525B}" type="datetimeFigureOut">
               <a:rPr lang="en-US" smtClean="0"/>
-              <a:t>4/30/2019</a:t>
+              <a:t>5/20/2019</a:t>
             </a:fld>
             <a:endParaRPr lang="en-US"/>
           </a:p>
@@ -21285,30 +22300,6 @@
           </a:p>
         </p:txBody>
       </p:sp>
-      <p:graphicFrame>
-        <p:nvGraphicFramePr>
-          <p:cNvPr id="4" name="Chart 3"/>
-          <p:cNvGraphicFramePr>
-            <a:graphicFrameLocks/>
-          </p:cNvGraphicFramePr>
-          <p:nvPr>
-            <p:extLst>
-              <p:ext uri="{D42A27DB-BD31-4B8C-83A1-F6EECF244321}">
-                <p14:modId xmlns:p14="http://schemas.microsoft.com/office/powerpoint/2010/main" val="655447052"/>
-              </p:ext>
-            </p:extLst>
-          </p:nvPr>
-        </p:nvGraphicFramePr>
-        <p:xfrm>
-          <a:off x="438839" y="3687897"/>
-          <a:ext cx="4572000" cy="2743200"/>
-        </p:xfrm>
-        <a:graphic>
-          <a:graphicData uri="http://schemas.openxmlformats.org/drawingml/2006/chart">
-            <c:chart xmlns:c="http://schemas.openxmlformats.org/drawingml/2006/chart" xmlns:r="http://schemas.openxmlformats.org/officeDocument/2006/relationships" r:id="rId2"/>
-          </a:graphicData>
-        </a:graphic>
-      </p:graphicFrame>
     </p:spTree>
     <p:extLst>
       <p:ext uri="{BB962C8B-B14F-4D97-AF65-F5344CB8AC3E}">
@@ -21330,6 +22321,138 @@
 </file>
 
 <file path=ppt/slides/slide10.xml><?xml version="1.0" encoding="utf-8"?>
+<p:sld xmlns:a="http://schemas.openxmlformats.org/drawingml/2006/main" xmlns:r="http://schemas.openxmlformats.org/officeDocument/2006/relationships" xmlns:p="http://schemas.openxmlformats.org/presentationml/2006/main">
+  <p:cSld>
+    <p:spTree>
+      <p:nvGrpSpPr>
+        <p:cNvPr id="1" name=""/>
+        <p:cNvGrpSpPr/>
+        <p:nvPr/>
+      </p:nvGrpSpPr>
+      <p:grpSpPr>
+        <a:xfrm>
+          <a:off x="0" y="0"/>
+          <a:ext cx="0" cy="0"/>
+          <a:chOff x="0" y="0"/>
+          <a:chExt cx="0" cy="0"/>
+        </a:xfrm>
+      </p:grpSpPr>
+      <p:sp>
+        <p:nvSpPr>
+          <p:cNvPr id="2" name="Title 1"/>
+          <p:cNvSpPr>
+            <a:spLocks noGrp="1"/>
+          </p:cNvSpPr>
+          <p:nvPr>
+            <p:ph type="title"/>
+          </p:nvPr>
+        </p:nvSpPr>
+        <p:spPr/>
+        <p:txBody>
+          <a:bodyPr/>
+          <a:lstStyle/>
+          <a:p>
+            <a:r>
+              <a:rPr lang="en-US" dirty="0" smtClean="0"/>
+              <a:t>Natural Gas Henry Hub</a:t>
+            </a:r>
+            <a:endParaRPr lang="en-US" dirty="0"/>
+          </a:p>
+        </p:txBody>
+      </p:sp>
+      <p:sp>
+        <p:nvSpPr>
+          <p:cNvPr id="3" name="Content Placeholder 2"/>
+          <p:cNvSpPr>
+            <a:spLocks noGrp="1"/>
+          </p:cNvSpPr>
+          <p:nvPr>
+            <p:ph idx="1"/>
+          </p:nvPr>
+        </p:nvSpPr>
+        <p:spPr>
+          <a:xfrm>
+            <a:off x="782515" y="1825625"/>
+            <a:ext cx="5609493" cy="4351338"/>
+          </a:xfrm>
+        </p:spPr>
+        <p:txBody>
+          <a:bodyPr/>
+          <a:lstStyle/>
+          <a:p>
+            <a:endParaRPr lang="en-US"/>
+          </a:p>
+        </p:txBody>
+      </p:sp>
+      <p:pic>
+        <p:nvPicPr>
+          <p:cNvPr id="4" name="Picture 3"/>
+          <p:cNvPicPr>
+            <a:picLocks noChangeAspect="1"/>
+          </p:cNvPicPr>
+          <p:nvPr/>
+        </p:nvPicPr>
+        <p:blipFill>
+          <a:blip r:embed="rId2"/>
+          <a:stretch>
+            <a:fillRect/>
+          </a:stretch>
+        </p:blipFill>
+        <p:spPr>
+          <a:xfrm>
+            <a:off x="6526458" y="890868"/>
+            <a:ext cx="5436101" cy="3212073"/>
+          </a:xfrm>
+          <a:prstGeom prst="rect">
+            <a:avLst/>
+          </a:prstGeom>
+        </p:spPr>
+      </p:pic>
+      <p:graphicFrame>
+        <p:nvGraphicFramePr>
+          <p:cNvPr id="5" name="Chart 4"/>
+          <p:cNvGraphicFramePr>
+            <a:graphicFrameLocks/>
+          </p:cNvGraphicFramePr>
+          <p:nvPr>
+            <p:extLst>
+              <p:ext uri="{D42A27DB-BD31-4B8C-83A1-F6EECF244321}">
+                <p14:modId xmlns:p14="http://schemas.microsoft.com/office/powerpoint/2010/main" val="243059541"/>
+              </p:ext>
+            </p:extLst>
+          </p:nvPr>
+        </p:nvGraphicFramePr>
+        <p:xfrm>
+          <a:off x="7175988" y="4102941"/>
+          <a:ext cx="4572000" cy="2743200"/>
+        </p:xfrm>
+        <a:graphic>
+          <a:graphicData uri="http://schemas.openxmlformats.org/drawingml/2006/chart">
+            <c:chart xmlns:c="http://schemas.openxmlformats.org/drawingml/2006/chart" xmlns:r="http://schemas.openxmlformats.org/officeDocument/2006/relationships" r:id="rId3"/>
+          </a:graphicData>
+        </a:graphic>
+      </p:graphicFrame>
+    </p:spTree>
+    <p:extLst>
+      <p:ext uri="{BB962C8B-B14F-4D97-AF65-F5344CB8AC3E}">
+        <p14:creationId xmlns:p14="http://schemas.microsoft.com/office/powerpoint/2010/main" val="1383912630"/>
+      </p:ext>
+    </p:extLst>
+  </p:cSld>
+  <p:clrMapOvr>
+    <a:masterClrMapping/>
+  </p:clrMapOvr>
+  <p:timing>
+    <p:tnLst>
+      <p:par>
+        <p:cTn id="1" dur="indefinite" restart="never" nodeType="tmRoot"/>
+      </p:par>
+    </p:tnLst>
+  </p:timing>
+</p:sld>
+</file>
+
+<file path=ppt/slides/slide11.xml><?xml version="1.0" encoding="utf-8"?>
 <p:sld xmlns:a="http://schemas.openxmlformats.org/drawingml/2006/main" xmlns:r="http://schemas.openxmlformats.org/officeDocument/2006/relationships" xmlns:p="http://schemas.openxmlformats.org/presentationml/2006/main">
   <p:cSld>
     <p:spTree>
@@ -21462,7 +22585,7 @@
 </p:sld>
 </file>
 
-<file path=ppt/slides/slide11.xml><?xml version="1.0" encoding="utf-8"?>
+<file path=ppt/slides/slide12.xml><?xml version="1.0" encoding="utf-8"?>
 <p:sld xmlns:a="http://schemas.openxmlformats.org/drawingml/2006/main" xmlns:r="http://schemas.openxmlformats.org/officeDocument/2006/relationships" xmlns:p="http://schemas.openxmlformats.org/presentationml/2006/main">
   <p:cSld>
     <p:spTree>
@@ -21643,7 +22766,7 @@
 </p:sld>
 </file>
 
-<file path=ppt/slides/slide12.xml><?xml version="1.0" encoding="utf-8"?>
+<file path=ppt/slides/slide13.xml><?xml version="1.0" encoding="utf-8"?>
 <p:sld xmlns:a="http://schemas.openxmlformats.org/drawingml/2006/main" xmlns:r="http://schemas.openxmlformats.org/officeDocument/2006/relationships" xmlns:p="http://schemas.openxmlformats.org/presentationml/2006/main">
   <p:cSld>
     <p:spTree>
@@ -21752,7 +22875,7 @@
 </p:sld>
 </file>
 
-<file path=ppt/slides/slide13.xml><?xml version="1.0" encoding="utf-8"?>
+<file path=ppt/slides/slide14.xml><?xml version="1.0" encoding="utf-8"?>
 <p:sld xmlns:a="http://schemas.openxmlformats.org/drawingml/2006/main" xmlns:r="http://schemas.openxmlformats.org/officeDocument/2006/relationships" xmlns:p="http://schemas.openxmlformats.org/presentationml/2006/main">
   <p:cSld>
     <p:spTree>
@@ -21897,7 +23020,167 @@
 </p:sld>
 </file>
 
+<file path=ppt/slides/slide15.xml><?xml version="1.0" encoding="utf-8"?>
+<p:sld xmlns:a="http://schemas.openxmlformats.org/drawingml/2006/main" xmlns:r="http://schemas.openxmlformats.org/officeDocument/2006/relationships" xmlns:p="http://schemas.openxmlformats.org/presentationml/2006/main">
+  <p:cSld>
+    <p:spTree>
+      <p:nvGrpSpPr>
+        <p:cNvPr id="1" name=""/>
+        <p:cNvGrpSpPr/>
+        <p:nvPr/>
+      </p:nvGrpSpPr>
+      <p:grpSpPr>
+        <a:xfrm>
+          <a:off x="0" y="0"/>
+          <a:ext cx="0" cy="0"/>
+          <a:chOff x="0" y="0"/>
+          <a:chExt cx="0" cy="0"/>
+        </a:xfrm>
+      </p:grpSpPr>
+      <p:sp>
+        <p:nvSpPr>
+          <p:cNvPr id="2" name="Title 1"/>
+          <p:cNvSpPr>
+            <a:spLocks noGrp="1"/>
+          </p:cNvSpPr>
+          <p:nvPr>
+            <p:ph type="title"/>
+          </p:nvPr>
+        </p:nvSpPr>
+        <p:spPr/>
+        <p:txBody>
+          <a:bodyPr/>
+          <a:lstStyle/>
+          <a:p>
+            <a:endParaRPr lang="en-US"/>
+          </a:p>
+        </p:txBody>
+      </p:sp>
+      <p:sp>
+        <p:nvSpPr>
+          <p:cNvPr id="3" name="Content Placeholder 2"/>
+          <p:cNvSpPr>
+            <a:spLocks noGrp="1"/>
+          </p:cNvSpPr>
+          <p:nvPr>
+            <p:ph idx="1"/>
+          </p:nvPr>
+        </p:nvSpPr>
+        <p:spPr/>
+        <p:txBody>
+          <a:bodyPr/>
+          <a:lstStyle/>
+          <a:p>
+            <a:endParaRPr lang="en-US"/>
+          </a:p>
+        </p:txBody>
+      </p:sp>
+    </p:spTree>
+    <p:extLst>
+      <p:ext uri="{BB962C8B-B14F-4D97-AF65-F5344CB8AC3E}">
+        <p14:creationId xmlns:p14="http://schemas.microsoft.com/office/powerpoint/2010/main" val="3666909621"/>
+      </p:ext>
+    </p:extLst>
+  </p:cSld>
+  <p:clrMapOvr>
+    <a:masterClrMapping/>
+  </p:clrMapOvr>
+</p:sld>
+</file>
+
 <file path=ppt/slides/slide2.xml><?xml version="1.0" encoding="utf-8"?>
+<p:sld xmlns:a="http://schemas.openxmlformats.org/drawingml/2006/main" xmlns:r="http://schemas.openxmlformats.org/officeDocument/2006/relationships" xmlns:p="http://schemas.openxmlformats.org/presentationml/2006/main">
+  <p:cSld>
+    <p:spTree>
+      <p:nvGrpSpPr>
+        <p:cNvPr id="1" name=""/>
+        <p:cNvGrpSpPr/>
+        <p:nvPr/>
+      </p:nvGrpSpPr>
+      <p:grpSpPr>
+        <a:xfrm>
+          <a:off x="0" y="0"/>
+          <a:ext cx="0" cy="0"/>
+          <a:chOff x="0" y="0"/>
+          <a:chExt cx="0" cy="0"/>
+        </a:xfrm>
+      </p:grpSpPr>
+      <p:sp>
+        <p:nvSpPr>
+          <p:cNvPr id="2" name="Title 1"/>
+          <p:cNvSpPr>
+            <a:spLocks noGrp="1"/>
+          </p:cNvSpPr>
+          <p:nvPr>
+            <p:ph type="title"/>
+          </p:nvPr>
+        </p:nvSpPr>
+        <p:spPr/>
+        <p:txBody>
+          <a:bodyPr/>
+          <a:lstStyle/>
+          <a:p>
+            <a:endParaRPr lang="en-US"/>
+          </a:p>
+        </p:txBody>
+      </p:sp>
+      <p:sp>
+        <p:nvSpPr>
+          <p:cNvPr id="3" name="Content Placeholder 2"/>
+          <p:cNvSpPr>
+            <a:spLocks noGrp="1"/>
+          </p:cNvSpPr>
+          <p:nvPr>
+            <p:ph idx="1"/>
+          </p:nvPr>
+        </p:nvSpPr>
+        <p:spPr/>
+        <p:txBody>
+          <a:bodyPr/>
+          <a:lstStyle/>
+          <a:p>
+            <a:endParaRPr lang="en-US" dirty="0"/>
+          </a:p>
+        </p:txBody>
+      </p:sp>
+      <p:graphicFrame>
+        <p:nvGraphicFramePr>
+          <p:cNvPr id="4" name="Chart 3"/>
+          <p:cNvGraphicFramePr>
+            <a:graphicFrameLocks/>
+          </p:cNvGraphicFramePr>
+          <p:nvPr>
+            <p:extLst>
+              <p:ext uri="{D42A27DB-BD31-4B8C-83A1-F6EECF244321}">
+                <p14:modId xmlns:p14="http://schemas.microsoft.com/office/powerpoint/2010/main" val="3940249241"/>
+              </p:ext>
+            </p:extLst>
+          </p:nvPr>
+        </p:nvGraphicFramePr>
+        <p:xfrm>
+          <a:off x="438839" y="3687897"/>
+          <a:ext cx="4572000" cy="2743200"/>
+        </p:xfrm>
+        <a:graphic>
+          <a:graphicData uri="http://schemas.openxmlformats.org/drawingml/2006/chart">
+            <c:chart xmlns:c="http://schemas.openxmlformats.org/drawingml/2006/chart" xmlns:r="http://schemas.openxmlformats.org/officeDocument/2006/relationships" r:id="rId2"/>
+          </a:graphicData>
+        </a:graphic>
+      </p:graphicFrame>
+    </p:spTree>
+    <p:extLst>
+      <p:ext uri="{BB962C8B-B14F-4D97-AF65-F5344CB8AC3E}">
+        <p14:creationId xmlns:p14="http://schemas.microsoft.com/office/powerpoint/2010/main" val="1526121333"/>
+      </p:ext>
+    </p:extLst>
+  </p:cSld>
+  <p:clrMapOvr>
+    <a:masterClrMapping/>
+  </p:clrMapOvr>
+</p:sld>
+</file>
+
+<file path=ppt/slides/slide3.xml><?xml version="1.0" encoding="utf-8"?>
 <p:sld xmlns:a="http://schemas.openxmlformats.org/drawingml/2006/main" xmlns:r="http://schemas.openxmlformats.org/officeDocument/2006/relationships" xmlns:p="http://schemas.openxmlformats.org/presentationml/2006/main">
   <p:cSld>
     <p:spTree>
@@ -22169,7 +23452,7 @@
 </p:sld>
 </file>
 
-<file path=ppt/slides/slide3.xml><?xml version="1.0" encoding="utf-8"?>
+<file path=ppt/slides/slide4.xml><?xml version="1.0" encoding="utf-8"?>
 <p:sld xmlns:a="http://schemas.openxmlformats.org/drawingml/2006/main" xmlns:r="http://schemas.openxmlformats.org/officeDocument/2006/relationships" xmlns:p="http://schemas.openxmlformats.org/presentationml/2006/main">
   <p:cSld>
     <p:spTree>
@@ -22684,7 +23967,7 @@
 </p:sld>
 </file>
 
-<file path=ppt/slides/slide4.xml><?xml version="1.0" encoding="utf-8"?>
+<file path=ppt/slides/slide5.xml><?xml version="1.0" encoding="utf-8"?>
 <p:sld xmlns:a="http://schemas.openxmlformats.org/drawingml/2006/main" xmlns:r="http://schemas.openxmlformats.org/officeDocument/2006/relationships" xmlns:p="http://schemas.openxmlformats.org/presentationml/2006/main">
   <p:cSld>
     <p:spTree>
@@ -22799,8 +24082,8 @@
         </p:blipFill>
         <p:spPr>
           <a:xfrm>
-            <a:off x="7561385" y="1502346"/>
-            <a:ext cx="4273062" cy="4054392"/>
+            <a:off x="8706010" y="35083"/>
+            <a:ext cx="3335906" cy="3007794"/>
           </a:xfrm>
           <a:prstGeom prst="rect">
             <a:avLst/>
@@ -23653,6 +24936,30 @@
           </a:graphicData>
         </a:graphic>
       </p:graphicFrame>
+      <p:graphicFrame>
+        <p:nvGraphicFramePr>
+          <p:cNvPr id="6" name="Chart 5"/>
+          <p:cNvGraphicFramePr>
+            <a:graphicFrameLocks/>
+          </p:cNvGraphicFramePr>
+          <p:nvPr>
+            <p:extLst>
+              <p:ext uri="{D42A27DB-BD31-4B8C-83A1-F6EECF244321}">
+                <p14:modId xmlns:p14="http://schemas.microsoft.com/office/powerpoint/2010/main" val="4260929877"/>
+              </p:ext>
+            </p:extLst>
+          </p:nvPr>
+        </p:nvGraphicFramePr>
+        <p:xfrm>
+          <a:off x="7530353" y="4172099"/>
+          <a:ext cx="4242435" cy="2497642"/>
+        </p:xfrm>
+        <a:graphic>
+          <a:graphicData uri="http://schemas.openxmlformats.org/drawingml/2006/chart">
+            <c:chart xmlns:c="http://schemas.openxmlformats.org/drawingml/2006/chart" xmlns:r="http://schemas.openxmlformats.org/officeDocument/2006/relationships" r:id="rId3"/>
+          </a:graphicData>
+        </a:graphic>
+      </p:graphicFrame>
     </p:spTree>
     <p:extLst>
       <p:ext uri="{BB962C8B-B14F-4D97-AF65-F5344CB8AC3E}">
@@ -23673,7 +24980,7 @@
 </p:sld>
 </file>
 
-<file path=ppt/slides/slide5.xml><?xml version="1.0" encoding="utf-8"?>
+<file path=ppt/slides/slide6.xml><?xml version="1.0" encoding="utf-8"?>
 <p:sld xmlns:a="http://schemas.openxmlformats.org/drawingml/2006/main" xmlns:r="http://schemas.openxmlformats.org/officeDocument/2006/relationships" xmlns:p="http://schemas.openxmlformats.org/presentationml/2006/main">
   <p:cSld>
     <p:spTree>
@@ -25495,7 +26802,7 @@
 </p:sld>
 </file>
 
-<file path=ppt/slides/slide6.xml><?xml version="1.0" encoding="utf-8"?>
+<file path=ppt/slides/slide7.xml><?xml version="1.0" encoding="utf-8"?>
 <p:sld xmlns:a="http://schemas.openxmlformats.org/drawingml/2006/main" xmlns:r="http://schemas.openxmlformats.org/officeDocument/2006/relationships" xmlns:p="http://schemas.openxmlformats.org/presentationml/2006/main">
   <p:cSld>
     <p:spTree>
@@ -25746,7 +27053,7 @@
 </p:sld>
 </file>
 
-<file path=ppt/slides/slide7.xml><?xml version="1.0" encoding="utf-8"?>
+<file path=ppt/slides/slide8.xml><?xml version="1.0" encoding="utf-8"?>
 <p:sld xmlns:a="http://schemas.openxmlformats.org/drawingml/2006/main" xmlns:r="http://schemas.openxmlformats.org/officeDocument/2006/relationships" xmlns:p="http://schemas.openxmlformats.org/presentationml/2006/main">
   <p:cSld>
     <p:spTree>
@@ -27567,7 +28874,7 @@
 </p:sld>
 </file>
 
-<file path=ppt/slides/slide8.xml><?xml version="1.0" encoding="utf-8"?>
+<file path=ppt/slides/slide9.xml><?xml version="1.0" encoding="utf-8"?>
 <p:sld xmlns:a="http://schemas.openxmlformats.org/drawingml/2006/main" xmlns:r="http://schemas.openxmlformats.org/officeDocument/2006/relationships" xmlns:p="http://schemas.openxmlformats.org/presentationml/2006/main">
   <p:cSld>
     <p:spTree>
@@ -27688,138 +28995,6 @@
     <p:extLst>
       <p:ext uri="{BB962C8B-B14F-4D97-AF65-F5344CB8AC3E}">
         <p14:creationId xmlns:p14="http://schemas.microsoft.com/office/powerpoint/2010/main" val="3937283864"/>
-      </p:ext>
-    </p:extLst>
-  </p:cSld>
-  <p:clrMapOvr>
-    <a:masterClrMapping/>
-  </p:clrMapOvr>
-  <p:timing>
-    <p:tnLst>
-      <p:par>
-        <p:cTn id="1" dur="indefinite" restart="never" nodeType="tmRoot"/>
-      </p:par>
-    </p:tnLst>
-  </p:timing>
-</p:sld>
-</file>
-
-<file path=ppt/slides/slide9.xml><?xml version="1.0" encoding="utf-8"?>
-<p:sld xmlns:a="http://schemas.openxmlformats.org/drawingml/2006/main" xmlns:r="http://schemas.openxmlformats.org/officeDocument/2006/relationships" xmlns:p="http://schemas.openxmlformats.org/presentationml/2006/main">
-  <p:cSld>
-    <p:spTree>
-      <p:nvGrpSpPr>
-        <p:cNvPr id="1" name=""/>
-        <p:cNvGrpSpPr/>
-        <p:nvPr/>
-      </p:nvGrpSpPr>
-      <p:grpSpPr>
-        <a:xfrm>
-          <a:off x="0" y="0"/>
-          <a:ext cx="0" cy="0"/>
-          <a:chOff x="0" y="0"/>
-          <a:chExt cx="0" cy="0"/>
-        </a:xfrm>
-      </p:grpSpPr>
-      <p:sp>
-        <p:nvSpPr>
-          <p:cNvPr id="2" name="Title 1"/>
-          <p:cNvSpPr>
-            <a:spLocks noGrp="1"/>
-          </p:cNvSpPr>
-          <p:nvPr>
-            <p:ph type="title"/>
-          </p:nvPr>
-        </p:nvSpPr>
-        <p:spPr/>
-        <p:txBody>
-          <a:bodyPr/>
-          <a:lstStyle/>
-          <a:p>
-            <a:r>
-              <a:rPr lang="en-US" dirty="0" smtClean="0"/>
-              <a:t>Natural Gas Henry Hub</a:t>
-            </a:r>
-            <a:endParaRPr lang="en-US" dirty="0"/>
-          </a:p>
-        </p:txBody>
-      </p:sp>
-      <p:sp>
-        <p:nvSpPr>
-          <p:cNvPr id="3" name="Content Placeholder 2"/>
-          <p:cNvSpPr>
-            <a:spLocks noGrp="1"/>
-          </p:cNvSpPr>
-          <p:nvPr>
-            <p:ph idx="1"/>
-          </p:nvPr>
-        </p:nvSpPr>
-        <p:spPr>
-          <a:xfrm>
-            <a:off x="782515" y="1825625"/>
-            <a:ext cx="5609493" cy="4351338"/>
-          </a:xfrm>
-        </p:spPr>
-        <p:txBody>
-          <a:bodyPr/>
-          <a:lstStyle/>
-          <a:p>
-            <a:endParaRPr lang="en-US"/>
-          </a:p>
-        </p:txBody>
-      </p:sp>
-      <p:pic>
-        <p:nvPicPr>
-          <p:cNvPr id="4" name="Picture 3"/>
-          <p:cNvPicPr>
-            <a:picLocks noChangeAspect="1"/>
-          </p:cNvPicPr>
-          <p:nvPr/>
-        </p:nvPicPr>
-        <p:blipFill>
-          <a:blip r:embed="rId2"/>
-          <a:stretch>
-            <a:fillRect/>
-          </a:stretch>
-        </p:blipFill>
-        <p:spPr>
-          <a:xfrm>
-            <a:off x="6526458" y="890868"/>
-            <a:ext cx="5436101" cy="3212073"/>
-          </a:xfrm>
-          <a:prstGeom prst="rect">
-            <a:avLst/>
-          </a:prstGeom>
-        </p:spPr>
-      </p:pic>
-      <p:graphicFrame>
-        <p:nvGraphicFramePr>
-          <p:cNvPr id="5" name="Chart 4"/>
-          <p:cNvGraphicFramePr>
-            <a:graphicFrameLocks/>
-          </p:cNvGraphicFramePr>
-          <p:nvPr>
-            <p:extLst>
-              <p:ext uri="{D42A27DB-BD31-4B8C-83A1-F6EECF244321}">
-                <p14:modId xmlns:p14="http://schemas.microsoft.com/office/powerpoint/2010/main" val="243059541"/>
-              </p:ext>
-            </p:extLst>
-          </p:nvPr>
-        </p:nvGraphicFramePr>
-        <p:xfrm>
-          <a:off x="7175988" y="4102941"/>
-          <a:ext cx="4572000" cy="2743200"/>
-        </p:xfrm>
-        <a:graphic>
-          <a:graphicData uri="http://schemas.openxmlformats.org/drawingml/2006/chart">
-            <c:chart xmlns:c="http://schemas.openxmlformats.org/drawingml/2006/chart" xmlns:r="http://schemas.openxmlformats.org/officeDocument/2006/relationships" r:id="rId3"/>
-          </a:graphicData>
-        </a:graphic>
-      </p:graphicFrame>
-    </p:spTree>
-    <p:extLst>
-      <p:ext uri="{BB962C8B-B14F-4D97-AF65-F5344CB8AC3E}">
-        <p14:creationId xmlns:p14="http://schemas.microsoft.com/office/powerpoint/2010/main" val="1383912630"/>
       </p:ext>
     </p:extLst>
   </p:cSld>

</xml_diff>